<commit_message>
slides for week 3
</commit_message>
<xml_diff>
--- a/03-efficient-item-allocation/slides.pptx
+++ b/03-efficient-item-allocation/slides.pptx
@@ -9010,7 +9010,7 @@
           <a:p>
             <a:fld id="{4CAFD516-5597-4621-8393-09812E019982}" type="datetimeFigureOut">
               <a:rPr lang="he-IL" smtClean="0"/>
-              <a:t>כ"ט/ניסן/תשפ"ה</a:t>
+              <a:t>י"ח/חשון/תשפ"ו</a:t>
             </a:fld>
             <a:endParaRPr lang="he-IL"/>
           </a:p>
@@ -9210,7 +9210,7 @@
           <a:p>
             <a:fld id="{4CAFD516-5597-4621-8393-09812E019982}" type="datetimeFigureOut">
               <a:rPr lang="he-IL" smtClean="0"/>
-              <a:t>כ"ט/ניסן/תשפ"ה</a:t>
+              <a:t>י"ח/חשון/תשפ"ו</a:t>
             </a:fld>
             <a:endParaRPr lang="he-IL"/>
           </a:p>
@@ -9486,7 +9486,7 @@
           <a:p>
             <a:fld id="{4CAFD516-5597-4621-8393-09812E019982}" type="datetimeFigureOut">
               <a:rPr lang="he-IL" smtClean="0"/>
-              <a:t>כ"ט/ניסן/תשפ"ה</a:t>
+              <a:t>י"ח/חשון/תשפ"ו</a:t>
             </a:fld>
             <a:endParaRPr lang="he-IL"/>
           </a:p>
@@ -9754,7 +9754,7 @@
           <a:p>
             <a:fld id="{4CAFD516-5597-4621-8393-09812E019982}" type="datetimeFigureOut">
               <a:rPr lang="he-IL" smtClean="0"/>
-              <a:t>כ"ט/ניסן/תשפ"ה</a:t>
+              <a:t>י"ח/חשון/תשפ"ו</a:t>
             </a:fld>
             <a:endParaRPr lang="he-IL"/>
           </a:p>
@@ -10169,7 +10169,7 @@
           <a:p>
             <a:fld id="{4CAFD516-5597-4621-8393-09812E019982}" type="datetimeFigureOut">
               <a:rPr lang="he-IL" smtClean="0"/>
-              <a:t>כ"ט/ניסן/תשפ"ה</a:t>
+              <a:t>י"ח/חשון/תשפ"ו</a:t>
             </a:fld>
             <a:endParaRPr lang="he-IL"/>
           </a:p>
@@ -10311,7 +10311,7 @@
           <a:p>
             <a:fld id="{4CAFD516-5597-4621-8393-09812E019982}" type="datetimeFigureOut">
               <a:rPr lang="he-IL" smtClean="0"/>
-              <a:t>כ"ט/ניסן/תשפ"ה</a:t>
+              <a:t>י"ח/חשון/תשפ"ו</a:t>
             </a:fld>
             <a:endParaRPr lang="he-IL"/>
           </a:p>
@@ -10687,7 +10687,7 @@
           <a:p>
             <a:fld id="{4CAFD516-5597-4621-8393-09812E019982}" type="datetimeFigureOut">
               <a:rPr lang="he-IL" smtClean="0"/>
-              <a:t>כ"ט/ניסן/תשפ"ה</a:t>
+              <a:t>י"ח/חשון/תשפ"ו</a:t>
             </a:fld>
             <a:endParaRPr lang="he-IL"/>
           </a:p>
@@ -11000,7 +11000,7 @@
           <a:p>
             <a:fld id="{4CAFD516-5597-4621-8393-09812E019982}" type="datetimeFigureOut">
               <a:rPr lang="he-IL" smtClean="0"/>
-              <a:t>כ"ט/ניסן/תשפ"ה</a:t>
+              <a:t>י"ח/חשון/תשפ"ו</a:t>
             </a:fld>
             <a:endParaRPr lang="he-IL"/>
           </a:p>
@@ -11289,7 +11289,7 @@
           <a:p>
             <a:fld id="{4CAFD516-5597-4621-8393-09812E019982}" type="datetimeFigureOut">
               <a:rPr lang="he-IL" smtClean="0"/>
-              <a:t>כ"ט/ניסן/תשפ"ה</a:t>
+              <a:t>י"ח/חשון/תשפ"ו</a:t>
             </a:fld>
             <a:endParaRPr lang="he-IL"/>
           </a:p>
@@ -11489,7 +11489,7 @@
           <a:p>
             <a:fld id="{4CAFD516-5597-4621-8393-09812E019982}" type="datetimeFigureOut">
               <a:rPr lang="he-IL" smtClean="0"/>
-              <a:t>כ"ט/ניסן/תשפ"ה</a:t>
+              <a:t>י"ח/חשון/תשפ"ו</a:t>
             </a:fld>
             <a:endParaRPr lang="he-IL"/>
           </a:p>
@@ -11699,7 +11699,7 @@
           <a:p>
             <a:fld id="{4CAFD516-5597-4621-8393-09812E019982}" type="datetimeFigureOut">
               <a:rPr lang="he-IL" smtClean="0"/>
-              <a:t>כ"ט/ניסן/תשפ"ה</a:t>
+              <a:t>י"ח/חשון/תשפ"ו</a:t>
             </a:fld>
             <a:endParaRPr lang="he-IL"/>
           </a:p>
@@ -14827,7 +14827,7 @@
           <a:p>
             <a:fld id="{4CAFD516-5597-4621-8393-09812E019982}" type="datetimeFigureOut">
               <a:rPr lang="he-IL" smtClean="0"/>
-              <a:t>כ"ט/ניסן/תשפ"ה</a:t>
+              <a:t>י"ח/חשון/תשפ"ו</a:t>
             </a:fld>
             <a:endParaRPr lang="he-IL"/>
           </a:p>
@@ -23978,7 +23978,19 @@
               <a:rPr lang="en-US" sz="5400">
                 <a:latin typeface="Liberation Sans" pitchFamily="34"/>
               </a:rPr>
-              <a:t>NP-קשות?</a:t>
+              <a:t>NP</a:t>
+            </a:r>
+            <a:r>
+              <a:rPr lang="he-IL" sz="5400">
+                <a:latin typeface="Liberation Sans" pitchFamily="34"/>
+              </a:rPr>
+              <a:t>-</a:t>
+            </a:r>
+            <a:r>
+              <a:rPr lang="en-US" sz="5400">
+                <a:latin typeface="Liberation Sans" pitchFamily="34"/>
+              </a:rPr>
+              <a:t>קשות?</a:t>
             </a:r>
           </a:p>
         </p:txBody>

</xml_diff>